<commit_message>
Small update Chap7 PPT again.
</commit_message>
<xml_diff>
--- a/BookChapterContent/Slides/Chap7.pptx
+++ b/BookChapterContent/Slides/Chap7.pptx
@@ -15407,7 +15407,6 @@
               <a:rPr lang="en-US" dirty="0" smtClean="0"/>
               <a:t> = lower-left-x = Camera-X – (WC-Width / 2)</a:t>
             </a:r>
-            <a:endParaRPr lang="en-US" dirty="0" smtClean="0"/>
           </a:p>
           <a:p>
             <a:pPr marL="0" indent="0">
@@ -15451,8 +15450,8 @@
         </p:nvSpPr>
         <p:spPr>
           <a:xfrm>
-            <a:off x="5029200" y="630918"/>
-            <a:ext cx="5992586" cy="3459389"/>
+            <a:off x="4723075" y="630918"/>
+            <a:ext cx="6298711" cy="3459389"/>
           </a:xfrm>
           <a:prstGeom prst="rect">
             <a:avLst/>
@@ -15460,7 +15459,7 @@
         </p:spPr>
         <p:txBody>
           <a:bodyPr vert="horz" lIns="91440" tIns="45720" rIns="91440" bIns="45720" rtlCol="0">
-            <a:normAutofit fontScale="85000" lnSpcReduction="20000"/>
+            <a:normAutofit fontScale="92500" lnSpcReduction="20000"/>
           </a:bodyPr>
           <a:lstStyle>
             <a:lvl1pPr marL="228600" indent="-228600" algn="l" defTabSz="914400" rtl="0" eaLnBrk="1" latinLnBrk="0" hangingPunct="1">

</xml_diff>